<commit_message>
8 players + load from code + new map
</commit_message>
<xml_diff>
--- a/refs/design map/Furachi na Kassai.pptx
+++ b/refs/design map/Furachi na Kassai.pptx
@@ -166,6 +166,11 @@
       </a:defRPr>
     </a:lvl9pPr>
   </p:defaultTextStyle>
+  <p:extLst>
+    <p:ext uri="{EFAFB233-063F-42B5-8137-9DF3F51BA10A}">
+      <p15:sldGuideLst xmlns:p15="http://schemas.microsoft.com/office/powerpoint/2012/main"/>
+    </p:ext>
+  </p:extLst>
 </p:presentation>
 </file>
 
@@ -316,7 +321,7 @@
           <a:p>
             <a:fld id="{17BCDF20-F52A-466D-B6DB-8BBE0A9593AF}" type="datetimeFigureOut">
               <a:rPr lang="fr-FR" smtClean="0"/>
-              <a:t>16/10/2022</a:t>
+              <a:t>26/10/2022</a:t>
             </a:fld>
             <a:endParaRPr lang="fr-FR"/>
           </a:p>
@@ -514,7 +519,7 @@
           <a:p>
             <a:fld id="{17BCDF20-F52A-466D-B6DB-8BBE0A9593AF}" type="datetimeFigureOut">
               <a:rPr lang="fr-FR" smtClean="0"/>
-              <a:t>16/10/2022</a:t>
+              <a:t>26/10/2022</a:t>
             </a:fld>
             <a:endParaRPr lang="fr-FR"/>
           </a:p>
@@ -722,7 +727,7 @@
           <a:p>
             <a:fld id="{17BCDF20-F52A-466D-B6DB-8BBE0A9593AF}" type="datetimeFigureOut">
               <a:rPr lang="fr-FR" smtClean="0"/>
-              <a:t>16/10/2022</a:t>
+              <a:t>26/10/2022</a:t>
             </a:fld>
             <a:endParaRPr lang="fr-FR"/>
           </a:p>
@@ -920,7 +925,7 @@
           <a:p>
             <a:fld id="{17BCDF20-F52A-466D-B6DB-8BBE0A9593AF}" type="datetimeFigureOut">
               <a:rPr lang="fr-FR" smtClean="0"/>
-              <a:t>16/10/2022</a:t>
+              <a:t>26/10/2022</a:t>
             </a:fld>
             <a:endParaRPr lang="fr-FR"/>
           </a:p>
@@ -1195,7 +1200,7 @@
           <a:p>
             <a:fld id="{17BCDF20-F52A-466D-B6DB-8BBE0A9593AF}" type="datetimeFigureOut">
               <a:rPr lang="fr-FR" smtClean="0"/>
-              <a:t>16/10/2022</a:t>
+              <a:t>26/10/2022</a:t>
             </a:fld>
             <a:endParaRPr lang="fr-FR"/>
           </a:p>
@@ -1460,7 +1465,7 @@
           <a:p>
             <a:fld id="{17BCDF20-F52A-466D-B6DB-8BBE0A9593AF}" type="datetimeFigureOut">
               <a:rPr lang="fr-FR" smtClean="0"/>
-              <a:t>16/10/2022</a:t>
+              <a:t>26/10/2022</a:t>
             </a:fld>
             <a:endParaRPr lang="fr-FR"/>
           </a:p>
@@ -1872,7 +1877,7 @@
           <a:p>
             <a:fld id="{17BCDF20-F52A-466D-B6DB-8BBE0A9593AF}" type="datetimeFigureOut">
               <a:rPr lang="fr-FR" smtClean="0"/>
-              <a:t>16/10/2022</a:t>
+              <a:t>26/10/2022</a:t>
             </a:fld>
             <a:endParaRPr lang="fr-FR"/>
           </a:p>
@@ -2013,7 +2018,7 @@
           <a:p>
             <a:fld id="{17BCDF20-F52A-466D-B6DB-8BBE0A9593AF}" type="datetimeFigureOut">
               <a:rPr lang="fr-FR" smtClean="0"/>
-              <a:t>16/10/2022</a:t>
+              <a:t>26/10/2022</a:t>
             </a:fld>
             <a:endParaRPr lang="fr-FR"/>
           </a:p>
@@ -2126,7 +2131,7 @@
           <a:p>
             <a:fld id="{17BCDF20-F52A-466D-B6DB-8BBE0A9593AF}" type="datetimeFigureOut">
               <a:rPr lang="fr-FR" smtClean="0"/>
-              <a:t>16/10/2022</a:t>
+              <a:t>26/10/2022</a:t>
             </a:fld>
             <a:endParaRPr lang="fr-FR"/>
           </a:p>
@@ -2437,7 +2442,7 @@
           <a:p>
             <a:fld id="{17BCDF20-F52A-466D-B6DB-8BBE0A9593AF}" type="datetimeFigureOut">
               <a:rPr lang="fr-FR" smtClean="0"/>
-              <a:t>16/10/2022</a:t>
+              <a:t>26/10/2022</a:t>
             </a:fld>
             <a:endParaRPr lang="fr-FR"/>
           </a:p>
@@ -2725,7 +2730,7 @@
           <a:p>
             <a:fld id="{17BCDF20-F52A-466D-B6DB-8BBE0A9593AF}" type="datetimeFigureOut">
               <a:rPr lang="fr-FR" smtClean="0"/>
-              <a:t>16/10/2022</a:t>
+              <a:t>26/10/2022</a:t>
             </a:fld>
             <a:endParaRPr lang="fr-FR"/>
           </a:p>
@@ -2966,7 +2971,7 @@
           <a:p>
             <a:fld id="{17BCDF20-F52A-466D-B6DB-8BBE0A9593AF}" type="datetimeFigureOut">
               <a:rPr lang="fr-FR" smtClean="0"/>
-              <a:t>16/10/2022</a:t>
+              <a:t>26/10/2022</a:t>
             </a:fld>
             <a:endParaRPr lang="fr-FR"/>
           </a:p>
@@ -15110,43 +15115,49 @@
           <a:p>
             <a:r>
               <a:rPr lang="fr-FR" dirty="0"/>
-              <a:t>0:00-0:27 : Couplet 1</a:t>
-            </a:r>
-          </a:p>
-          <a:p>
-            <a:r>
-              <a:rPr lang="fr-FR" dirty="0"/>
-              <a:t>0:27-0:47 : Refrain 1</a:t>
-            </a:r>
-          </a:p>
-          <a:p>
-            <a:r>
-              <a:rPr lang="fr-FR" dirty="0"/>
-              <a:t>0:47-1:10 : Couplet 2</a:t>
-            </a:r>
-          </a:p>
-          <a:p>
-            <a:r>
-              <a:rPr lang="fr-FR" dirty="0"/>
-              <a:t>1:10-1:20 : Refrain 2</a:t>
-            </a:r>
-          </a:p>
-          <a:p>
-            <a:r>
-              <a:rPr lang="fr-FR" dirty="0"/>
-              <a:t>1:20-1:44 : Couplet 3</a:t>
-            </a:r>
-          </a:p>
-          <a:p>
-            <a:r>
-              <a:rPr lang="fr-FR" dirty="0"/>
-              <a:t>1:43-2:08 : Refrain 3</a:t>
-            </a:r>
-          </a:p>
-          <a:p>
-            <a:r>
-              <a:rPr lang="fr-FR" dirty="0"/>
-              <a:t>2:08-2:20 : Couplet 4</a:t>
+              <a:t>0:00-0:27 : Couplet 1 - 0</a:t>
+            </a:r>
+          </a:p>
+          <a:p>
+            <a:r>
+              <a:rPr lang="fr-FR" dirty="0"/>
+              <a:t>0:27-0:47 : Refrain 1 - 76</a:t>
+            </a:r>
+          </a:p>
+          <a:p>
+            <a:r>
+              <a:rPr lang="fr-FR" dirty="0"/>
+              <a:t>0:47-1:10 : Couplet 2 - 124</a:t>
+            </a:r>
+          </a:p>
+          <a:p>
+            <a:r>
+              <a:rPr lang="fr-FR" dirty="0"/>
+              <a:t>1:10-1:20 : Refrain 2 - 188</a:t>
+            </a:r>
+          </a:p>
+          <a:p>
+            <a:r>
+              <a:rPr lang="fr-FR" dirty="0"/>
+              <a:t>1:20-1:44 : Couplet 3 - 236</a:t>
+            </a:r>
+          </a:p>
+          <a:p>
+            <a:r>
+              <a:rPr lang="fr-FR" dirty="0"/>
+              <a:t>1:43-2:08 : Refrain 3 - 290</a:t>
+            </a:r>
+          </a:p>
+          <a:p>
+            <a:r>
+              <a:rPr lang="fr-FR" dirty="0"/>
+              <a:t>2:08-2:20 : Couplet 4 – 338</a:t>
+            </a:r>
+          </a:p>
+          <a:p>
+            <a:r>
+              <a:rPr lang="fr-FR" dirty="0"/>
+              <a:t>372</a:t>
             </a:r>
           </a:p>
         </p:txBody>

</xml_diff>